<commit_message>
I made some changes in the primary documentation
</commit_message>
<xml_diff>
--- a/documentation/ad440-cloud-practicum.pptx
+++ b/documentation/ad440-cloud-practicum.pptx
@@ -5,7 +5,7 @@
     <p:sldMasterId id="2147483696" r:id="rId1"/>
   </p:sldMasterIdLst>
   <p:notesMasterIdLst>
-    <p:notesMasterId r:id="rId11"/>
+    <p:notesMasterId r:id="rId12"/>
   </p:notesMasterIdLst>
   <p:sldIdLst>
     <p:sldId id="256" r:id="rId2"/>
@@ -16,7 +16,8 @@
     <p:sldId id="260" r:id="rId7"/>
     <p:sldId id="263" r:id="rId8"/>
     <p:sldId id="261" r:id="rId9"/>
-    <p:sldId id="264" r:id="rId10"/>
+    <p:sldId id="265" r:id="rId10"/>
+    <p:sldId id="264" r:id="rId11"/>
   </p:sldIdLst>
   <p:sldSz cx="9144000" cy="6858000" type="screen4x3"/>
   <p:notesSz cx="6858000" cy="9144000"/>
@@ -1213,19 +1214,19 @@
     </dgm:pt>
   </dgm:ptLst>
   <dgm:cxnLst>
-    <dgm:cxn modelId="{6EE99DC5-F4BF-4A17-874B-041872183D38}" srcId="{B6FD5369-3C38-4612-9927-417454400848}" destId="{6D6FEACD-E8EE-4E2A-87D4-8FB6622D460D}" srcOrd="2" destOrd="0" parTransId="{52E9AEC8-E7B9-46A0-8975-CA3B17CACB9A}" sibTransId="{5CB0BFEE-7750-4ED4-91A4-138A1914D456}"/>
+    <dgm:cxn modelId="{46CB87CB-8D76-43B1-B41E-833FC8E1621D}" srcId="{8C464ACD-F6A5-439D-8542-20A816BF01E1}" destId="{085F5E5E-C1B8-4A27-979B-5EC849DDD4CB}" srcOrd="0" destOrd="0" parTransId="{E29016DA-EAD8-49C5-94D7-DE29BA364ED2}" sibTransId="{45F891DC-2053-459B-9609-C5BF91BBC57D}"/>
+    <dgm:cxn modelId="{91B5D3F5-A5B7-4BB4-92A5-F82556EC594F}" srcId="{29FB97E2-A602-491C-8467-0A0B08CB78D0}" destId="{C15DBF06-3BAC-449E-99B6-D0C3A42D0DD1}" srcOrd="0" destOrd="0" parTransId="{660169AF-43CD-4F8E-9F97-E763BCE48400}" sibTransId="{B1BD0697-54FE-4D79-A8D3-CA7AB648FF84}"/>
     <dgm:cxn modelId="{88992708-4C0D-40FC-8480-E9985EA49997}" srcId="{B6FD5369-3C38-4612-9927-417454400848}" destId="{8C464ACD-F6A5-439D-8542-20A816BF01E1}" srcOrd="0" destOrd="0" parTransId="{51AE30A2-525A-48AA-AD91-17EB5E0B6475}" sibTransId="{6826A065-D8B1-4F92-AFE5-F968B21CE87F}"/>
     <dgm:cxn modelId="{1C99FF02-DDD0-4994-A676-EA0AF2FB47FA}" type="presOf" srcId="{C15DBF06-3BAC-449E-99B6-D0C3A42D0DD1}" destId="{6B68134C-647F-48C5-80CE-E627CE48CAFC}" srcOrd="0" destOrd="0" presId="urn:microsoft.com/office/officeart/2005/8/layout/vList2"/>
+    <dgm:cxn modelId="{A32EB1FE-C949-4920-AA56-4012227F137E}" type="presOf" srcId="{8C464ACD-F6A5-439D-8542-20A816BF01E1}" destId="{426492E4-DAFF-40CF-BAE9-A975BB931F1F}" srcOrd="0" destOrd="0" presId="urn:microsoft.com/office/officeart/2005/8/layout/vList2"/>
     <dgm:cxn modelId="{5FB7E9B4-97E6-4491-9082-3C82E3318C5E}" srcId="{B6FD5369-3C38-4612-9927-417454400848}" destId="{29FB97E2-A602-491C-8467-0A0B08CB78D0}" srcOrd="1" destOrd="0" parTransId="{3768EBEA-EB6F-4683-BE8D-D3FA5BBF9C24}" sibTransId="{D6105367-6B14-4ED5-A0E3-6F735B2EA0D1}"/>
+    <dgm:cxn modelId="{6EE99DC5-F4BF-4A17-874B-041872183D38}" srcId="{B6FD5369-3C38-4612-9927-417454400848}" destId="{6D6FEACD-E8EE-4E2A-87D4-8FB6622D460D}" srcOrd="2" destOrd="0" parTransId="{52E9AEC8-E7B9-46A0-8975-CA3B17CACB9A}" sibTransId="{5CB0BFEE-7750-4ED4-91A4-138A1914D456}"/>
     <dgm:cxn modelId="{FE8CBF49-C8D3-4B6D-80E7-814EC9F12626}" type="presOf" srcId="{29FB97E2-A602-491C-8467-0A0B08CB78D0}" destId="{66749369-2E25-4678-878C-0A5152A38224}" srcOrd="0" destOrd="0" presId="urn:microsoft.com/office/officeart/2005/8/layout/vList2"/>
+    <dgm:cxn modelId="{ED81B72E-5605-46FE-82E0-B1808CBD655A}" type="presOf" srcId="{085F5E5E-C1B8-4A27-979B-5EC849DDD4CB}" destId="{4E10942C-94E6-4BD2-B563-5EBA2C096BC2}" srcOrd="0" destOrd="0" presId="urn:microsoft.com/office/officeart/2005/8/layout/vList2"/>
+    <dgm:cxn modelId="{1896D97C-0173-4242-821B-7AFCC6E10488}" type="presOf" srcId="{B6FD5369-3C38-4612-9927-417454400848}" destId="{893D9142-DD76-47DA-8353-014578DBCEDE}" srcOrd="0" destOrd="0" presId="urn:microsoft.com/office/officeart/2005/8/layout/vList2"/>
     <dgm:cxn modelId="{5F36E9C9-ABF4-49A4-96A0-62231AA74455}" type="presOf" srcId="{9A118DBE-F722-426E-95A1-FBEE62956AFF}" destId="{6B68134C-647F-48C5-80CE-E627CE48CAFC}" srcOrd="0" destOrd="1" presId="urn:microsoft.com/office/officeart/2005/8/layout/vList2"/>
     <dgm:cxn modelId="{EE78AAF9-49A7-4E4B-9FBA-F99185030E89}" type="presOf" srcId="{6D6FEACD-E8EE-4E2A-87D4-8FB6622D460D}" destId="{347BC703-E213-48B1-A3D8-AFFAB3148ABB}" srcOrd="0" destOrd="0" presId="urn:microsoft.com/office/officeart/2005/8/layout/vList2"/>
-    <dgm:cxn modelId="{1896D97C-0173-4242-821B-7AFCC6E10488}" type="presOf" srcId="{B6FD5369-3C38-4612-9927-417454400848}" destId="{893D9142-DD76-47DA-8353-014578DBCEDE}" srcOrd="0" destOrd="0" presId="urn:microsoft.com/office/officeart/2005/8/layout/vList2"/>
-    <dgm:cxn modelId="{91B5D3F5-A5B7-4BB4-92A5-F82556EC594F}" srcId="{29FB97E2-A602-491C-8467-0A0B08CB78D0}" destId="{C15DBF06-3BAC-449E-99B6-D0C3A42D0DD1}" srcOrd="0" destOrd="0" parTransId="{660169AF-43CD-4F8E-9F97-E763BCE48400}" sibTransId="{B1BD0697-54FE-4D79-A8D3-CA7AB648FF84}"/>
-    <dgm:cxn modelId="{A32EB1FE-C949-4920-AA56-4012227F137E}" type="presOf" srcId="{8C464ACD-F6A5-439D-8542-20A816BF01E1}" destId="{426492E4-DAFF-40CF-BAE9-A975BB931F1F}" srcOrd="0" destOrd="0" presId="urn:microsoft.com/office/officeart/2005/8/layout/vList2"/>
     <dgm:cxn modelId="{45D59715-71E5-4563-B8C6-868D816424C1}" srcId="{29FB97E2-A602-491C-8467-0A0B08CB78D0}" destId="{9A118DBE-F722-426E-95A1-FBEE62956AFF}" srcOrd="1" destOrd="0" parTransId="{25DD239D-4714-404B-B280-5C4E866DDC09}" sibTransId="{932B90EE-DF18-4474-AA53-0B5DBBA1420D}"/>
-    <dgm:cxn modelId="{46CB87CB-8D76-43B1-B41E-833FC8E1621D}" srcId="{8C464ACD-F6A5-439D-8542-20A816BF01E1}" destId="{085F5E5E-C1B8-4A27-979B-5EC849DDD4CB}" srcOrd="0" destOrd="0" parTransId="{E29016DA-EAD8-49C5-94D7-DE29BA364ED2}" sibTransId="{45F891DC-2053-459B-9609-C5BF91BBC57D}"/>
-    <dgm:cxn modelId="{ED81B72E-5605-46FE-82E0-B1808CBD655A}" type="presOf" srcId="{085F5E5E-C1B8-4A27-979B-5EC849DDD4CB}" destId="{4E10942C-94E6-4BD2-B563-5EBA2C096BC2}" srcOrd="0" destOrd="0" presId="urn:microsoft.com/office/officeart/2005/8/layout/vList2"/>
     <dgm:cxn modelId="{4F830321-8096-4102-9C82-6D87986226C7}" type="presParOf" srcId="{893D9142-DD76-47DA-8353-014578DBCEDE}" destId="{426492E4-DAFF-40CF-BAE9-A975BB931F1F}" srcOrd="0" destOrd="0" presId="urn:microsoft.com/office/officeart/2005/8/layout/vList2"/>
     <dgm:cxn modelId="{8B79F407-7501-4A4B-BE5B-0FF005835B93}" type="presParOf" srcId="{893D9142-DD76-47DA-8353-014578DBCEDE}" destId="{4E10942C-94E6-4BD2-B563-5EBA2C096BC2}" srcOrd="1" destOrd="0" presId="urn:microsoft.com/office/officeart/2005/8/layout/vList2"/>
     <dgm:cxn modelId="{96197A62-7DBD-4816-9603-B8782C3EFF48}" type="presParOf" srcId="{893D9142-DD76-47DA-8353-014578DBCEDE}" destId="{66749369-2E25-4678-878C-0A5152A38224}" srcOrd="2" destOrd="0" presId="urn:microsoft.com/office/officeart/2005/8/layout/vList2"/>
@@ -1250,378 +1251,6 @@
       <dsp:cNvGrpSpPr/>
     </dsp:nvGrpSpPr>
     <dsp:grpSpPr/>
-    <dsp:sp modelId="{426492E4-DAFF-40CF-BAE9-A975BB931F1F}">
-      <dsp:nvSpPr>
-        <dsp:cNvPr id="0" name=""/>
-        <dsp:cNvSpPr/>
-      </dsp:nvSpPr>
-      <dsp:spPr>
-        <a:xfrm>
-          <a:off x="0" y="380999"/>
-          <a:ext cx="7521575" cy="463331"/>
-        </a:xfrm>
-        <a:prstGeom prst="roundRect">
-          <a:avLst/>
-        </a:prstGeom>
-        <a:solidFill>
-          <a:schemeClr val="accent1">
-            <a:hueOff val="0"/>
-            <a:satOff val="0"/>
-            <a:lumOff val="0"/>
-            <a:alphaOff val="0"/>
-          </a:schemeClr>
-        </a:solidFill>
-        <a:ln w="15875" cap="flat" cmpd="sng" algn="ctr">
-          <a:solidFill>
-            <a:schemeClr val="lt1">
-              <a:hueOff val="0"/>
-              <a:satOff val="0"/>
-              <a:lumOff val="0"/>
-              <a:alphaOff val="0"/>
-            </a:schemeClr>
-          </a:solidFill>
-          <a:prstDash val="solid"/>
-        </a:ln>
-        <a:effectLst/>
-      </dsp:spPr>
-      <dsp:style>
-        <a:lnRef idx="2">
-          <a:scrgbClr r="0" g="0" b="0"/>
-        </a:lnRef>
-        <a:fillRef idx="1">
-          <a:scrgbClr r="0" g="0" b="0"/>
-        </a:fillRef>
-        <a:effectRef idx="0">
-          <a:scrgbClr r="0" g="0" b="0"/>
-        </a:effectRef>
-        <a:fontRef idx="minor">
-          <a:schemeClr val="lt1"/>
-        </a:fontRef>
-      </dsp:style>
-      <dsp:txBody>
-        <a:bodyPr spcFirstLastPara="0" vert="horz" wrap="square" lIns="72390" tIns="72390" rIns="72390" bIns="72390" numCol="1" spcCol="1270" anchor="ctr" anchorCtr="0">
-          <a:noAutofit/>
-        </a:bodyPr>
-        <a:lstStyle/>
-        <a:p>
-          <a:pPr lvl="0" algn="l" defTabSz="844550">
-            <a:lnSpc>
-              <a:spcPct val="90000"/>
-            </a:lnSpc>
-            <a:spcBef>
-              <a:spcPct val="0"/>
-            </a:spcBef>
-            <a:spcAft>
-              <a:spcPct val="35000"/>
-            </a:spcAft>
-          </a:pPr>
-          <a:r>
-            <a:rPr lang="en-US" sz="1900" kern="1200" dirty="0" smtClean="0"/>
-            <a:t>Twitter API		</a:t>
-          </a:r>
-          <a:endParaRPr lang="en-US" sz="1900" kern="1200" dirty="0"/>
-        </a:p>
-      </dsp:txBody>
-      <dsp:txXfrm>
-        <a:off x="22618" y="403617"/>
-        <a:ext cx="7476339" cy="418095"/>
-      </dsp:txXfrm>
-    </dsp:sp>
-    <dsp:sp modelId="{4E10942C-94E6-4BD2-B563-5EBA2C096BC2}">
-      <dsp:nvSpPr>
-        <dsp:cNvPr id="0" name=""/>
-        <dsp:cNvSpPr/>
-      </dsp:nvSpPr>
-      <dsp:spPr>
-        <a:xfrm>
-          <a:off x="0" y="990603"/>
-          <a:ext cx="7521575" cy="1059840"/>
-        </a:xfrm>
-        <a:prstGeom prst="rect">
-          <a:avLst/>
-        </a:prstGeom>
-        <a:noFill/>
-        <a:ln>
-          <a:noFill/>
-        </a:ln>
-        <a:effectLst/>
-      </dsp:spPr>
-      <dsp:style>
-        <a:lnRef idx="0">
-          <a:scrgbClr r="0" g="0" b="0"/>
-        </a:lnRef>
-        <a:fillRef idx="0">
-          <a:scrgbClr r="0" g="0" b="0"/>
-        </a:fillRef>
-        <a:effectRef idx="0">
-          <a:scrgbClr r="0" g="0" b="0"/>
-        </a:effectRef>
-        <a:fontRef idx="minor"/>
-      </dsp:style>
-      <dsp:txBody>
-        <a:bodyPr spcFirstLastPara="0" vert="horz" wrap="square" lIns="238810" tIns="24130" rIns="135128" bIns="24130" numCol="1" spcCol="1270" anchor="t" anchorCtr="0">
-          <a:noAutofit/>
-        </a:bodyPr>
-        <a:lstStyle/>
-        <a:p>
-          <a:pPr marL="114300" lvl="1" indent="-114300" algn="l" defTabSz="666750">
-            <a:lnSpc>
-              <a:spcPct val="90000"/>
-            </a:lnSpc>
-            <a:spcBef>
-              <a:spcPct val="0"/>
-            </a:spcBef>
-            <a:spcAft>
-              <a:spcPct val="20000"/>
-            </a:spcAft>
-            <a:buChar char="••"/>
-          </a:pPr>
-          <a:r>
-            <a:rPr lang="en-US" sz="1500" kern="1200" dirty="0" smtClean="0"/>
-            <a:t>   Oauth.IO</a:t>
-          </a:r>
-          <a:endParaRPr lang="en-US" sz="1500" kern="1200" dirty="0"/>
-        </a:p>
-      </dsp:txBody>
-      <dsp:txXfrm>
-        <a:off x="0" y="990603"/>
-        <a:ext cx="7521575" cy="1059840"/>
-      </dsp:txXfrm>
-    </dsp:sp>
-    <dsp:sp modelId="{66749369-2E25-4678-878C-0A5152A38224}">
-      <dsp:nvSpPr>
-        <dsp:cNvPr id="0" name=""/>
-        <dsp:cNvSpPr/>
-      </dsp:nvSpPr>
-      <dsp:spPr>
-        <a:xfrm>
-          <a:off x="0" y="1371605"/>
-          <a:ext cx="7521575" cy="506001"/>
-        </a:xfrm>
-        <a:prstGeom prst="roundRect">
-          <a:avLst/>
-        </a:prstGeom>
-        <a:solidFill>
-          <a:schemeClr val="accent1">
-            <a:hueOff val="0"/>
-            <a:satOff val="0"/>
-            <a:lumOff val="0"/>
-            <a:alphaOff val="0"/>
-          </a:schemeClr>
-        </a:solidFill>
-        <a:ln w="15875" cap="flat" cmpd="sng" algn="ctr">
-          <a:solidFill>
-            <a:schemeClr val="lt1">
-              <a:hueOff val="0"/>
-              <a:satOff val="0"/>
-              <a:lumOff val="0"/>
-              <a:alphaOff val="0"/>
-            </a:schemeClr>
-          </a:solidFill>
-          <a:prstDash val="solid"/>
-        </a:ln>
-        <a:effectLst/>
-      </dsp:spPr>
-      <dsp:style>
-        <a:lnRef idx="2">
-          <a:scrgbClr r="0" g="0" b="0"/>
-        </a:lnRef>
-        <a:fillRef idx="1">
-          <a:scrgbClr r="0" g="0" b="0"/>
-        </a:fillRef>
-        <a:effectRef idx="0">
-          <a:scrgbClr r="0" g="0" b="0"/>
-        </a:effectRef>
-        <a:fontRef idx="minor">
-          <a:schemeClr val="lt1"/>
-        </a:fontRef>
-      </dsp:style>
-      <dsp:txBody>
-        <a:bodyPr spcFirstLastPara="0" vert="horz" wrap="square" lIns="72390" tIns="72390" rIns="72390" bIns="72390" numCol="1" spcCol="1270" anchor="ctr" anchorCtr="0">
-          <a:noAutofit/>
-        </a:bodyPr>
-        <a:lstStyle/>
-        <a:p>
-          <a:pPr lvl="0" algn="l" defTabSz="844550">
-            <a:lnSpc>
-              <a:spcPct val="90000"/>
-            </a:lnSpc>
-            <a:spcBef>
-              <a:spcPct val="0"/>
-            </a:spcBef>
-            <a:spcAft>
-              <a:spcPct val="35000"/>
-            </a:spcAft>
-          </a:pPr>
-          <a:r>
-            <a:rPr lang="en-US" sz="1900" kern="1200" dirty="0" err="1" smtClean="0"/>
-            <a:t>AngularJS</a:t>
-          </a:r>
-          <a:endParaRPr lang="en-US" sz="1900" kern="1200" dirty="0"/>
-        </a:p>
-      </dsp:txBody>
-      <dsp:txXfrm>
-        <a:off x="24701" y="1396306"/>
-        <a:ext cx="7472173" cy="456599"/>
-      </dsp:txXfrm>
-    </dsp:sp>
-    <dsp:sp modelId="{6B68134C-647F-48C5-80CE-E627CE48CAFC}">
-      <dsp:nvSpPr>
-        <dsp:cNvPr id="0" name=""/>
-        <dsp:cNvSpPr/>
-      </dsp:nvSpPr>
-      <dsp:spPr>
-        <a:xfrm>
-          <a:off x="0" y="1981194"/>
-          <a:ext cx="7521575" cy="518773"/>
-        </a:xfrm>
-        <a:prstGeom prst="rect">
-          <a:avLst/>
-        </a:prstGeom>
-        <a:noFill/>
-        <a:ln>
-          <a:noFill/>
-        </a:ln>
-        <a:effectLst/>
-      </dsp:spPr>
-      <dsp:style>
-        <a:lnRef idx="0">
-          <a:scrgbClr r="0" g="0" b="0"/>
-        </a:lnRef>
-        <a:fillRef idx="0">
-          <a:scrgbClr r="0" g="0" b="0"/>
-        </a:fillRef>
-        <a:effectRef idx="0">
-          <a:scrgbClr r="0" g="0" b="0"/>
-        </a:effectRef>
-        <a:fontRef idx="minor"/>
-      </dsp:style>
-      <dsp:txBody>
-        <a:bodyPr spcFirstLastPara="0" vert="horz" wrap="square" lIns="238810" tIns="24130" rIns="135128" bIns="24130" numCol="1" spcCol="1270" anchor="t" anchorCtr="0">
-          <a:noAutofit/>
-        </a:bodyPr>
-        <a:lstStyle/>
-        <a:p>
-          <a:pPr marL="114300" lvl="1" indent="-114300" algn="l" defTabSz="666750">
-            <a:lnSpc>
-              <a:spcPct val="90000"/>
-            </a:lnSpc>
-            <a:spcBef>
-              <a:spcPct val="0"/>
-            </a:spcBef>
-            <a:spcAft>
-              <a:spcPct val="20000"/>
-            </a:spcAft>
-            <a:buChar char="••"/>
-          </a:pPr>
-          <a:r>
-            <a:rPr lang="en-US" sz="1500" kern="1200" dirty="0" smtClean="0"/>
-            <a:t>    Modules</a:t>
-          </a:r>
-          <a:endParaRPr lang="en-US" sz="1500" kern="1200" dirty="0"/>
-        </a:p>
-        <a:p>
-          <a:pPr marL="114300" lvl="1" indent="-114300" algn="l" defTabSz="666750">
-            <a:lnSpc>
-              <a:spcPct val="90000"/>
-            </a:lnSpc>
-            <a:spcBef>
-              <a:spcPct val="0"/>
-            </a:spcBef>
-            <a:spcAft>
-              <a:spcPct val="20000"/>
-            </a:spcAft>
-            <a:buChar char="••"/>
-          </a:pPr>
-          <a:r>
-            <a:rPr lang="en-US" sz="1500" kern="1200" dirty="0" smtClean="0"/>
-            <a:t>   Bootstrap</a:t>
-          </a:r>
-          <a:endParaRPr lang="en-US" sz="1500" kern="1200" dirty="0"/>
-        </a:p>
-      </dsp:txBody>
-      <dsp:txXfrm>
-        <a:off x="0" y="1981194"/>
-        <a:ext cx="7521575" cy="518773"/>
-      </dsp:txXfrm>
-    </dsp:sp>
-    <dsp:sp modelId="{347BC703-E213-48B1-A3D8-AFFAB3148ABB}">
-      <dsp:nvSpPr>
-        <dsp:cNvPr id="0" name=""/>
-        <dsp:cNvSpPr/>
-      </dsp:nvSpPr>
-      <dsp:spPr>
-        <a:xfrm>
-          <a:off x="0" y="2514595"/>
-          <a:ext cx="7521575" cy="506001"/>
-        </a:xfrm>
-        <a:prstGeom prst="roundRect">
-          <a:avLst/>
-        </a:prstGeom>
-        <a:solidFill>
-          <a:schemeClr val="accent1">
-            <a:hueOff val="0"/>
-            <a:satOff val="0"/>
-            <a:lumOff val="0"/>
-            <a:alphaOff val="0"/>
-          </a:schemeClr>
-        </a:solidFill>
-        <a:ln w="15875" cap="flat" cmpd="sng" algn="ctr">
-          <a:solidFill>
-            <a:schemeClr val="lt1">
-              <a:hueOff val="0"/>
-              <a:satOff val="0"/>
-              <a:lumOff val="0"/>
-              <a:alphaOff val="0"/>
-            </a:schemeClr>
-          </a:solidFill>
-          <a:prstDash val="solid"/>
-        </a:ln>
-        <a:effectLst/>
-      </dsp:spPr>
-      <dsp:style>
-        <a:lnRef idx="2">
-          <a:scrgbClr r="0" g="0" b="0"/>
-        </a:lnRef>
-        <a:fillRef idx="1">
-          <a:scrgbClr r="0" g="0" b="0"/>
-        </a:fillRef>
-        <a:effectRef idx="0">
-          <a:scrgbClr r="0" g="0" b="0"/>
-        </a:effectRef>
-        <a:fontRef idx="minor">
-          <a:schemeClr val="lt1"/>
-        </a:fontRef>
-      </dsp:style>
-      <dsp:txBody>
-        <a:bodyPr spcFirstLastPara="0" vert="horz" wrap="square" lIns="72390" tIns="72390" rIns="72390" bIns="72390" numCol="1" spcCol="1270" anchor="ctr" anchorCtr="0">
-          <a:noAutofit/>
-        </a:bodyPr>
-        <a:lstStyle/>
-        <a:p>
-          <a:pPr lvl="0" algn="l" defTabSz="844550">
-            <a:lnSpc>
-              <a:spcPct val="90000"/>
-            </a:lnSpc>
-            <a:spcBef>
-              <a:spcPct val="0"/>
-            </a:spcBef>
-            <a:spcAft>
-              <a:spcPct val="35000"/>
-            </a:spcAft>
-          </a:pPr>
-          <a:r>
-            <a:rPr lang="en-US" sz="1900" kern="1200" dirty="0" smtClean="0"/>
-            <a:t>Other</a:t>
-          </a:r>
-          <a:endParaRPr lang="en-US" sz="1900" kern="1200" dirty="0"/>
-        </a:p>
-      </dsp:txBody>
-      <dsp:txXfrm>
-        <a:off x="24701" y="2539296"/>
-        <a:ext cx="7472173" cy="456599"/>
-      </dsp:txXfrm>
-    </dsp:sp>
   </dsp:spTree>
 </dsp:drawing>
 </file>
@@ -3420,6 +3049,90 @@
     <p:extLst>
       <p:ext uri="{BB962C8B-B14F-4D97-AF65-F5344CB8AC3E}">
         <p14:creationId xmlns:p14="http://schemas.microsoft.com/office/powerpoint/2010/main" val="3694094097"/>
+      </p:ext>
+    </p:extLst>
+  </p:cSld>
+  <p:clrMapOvr>
+    <a:masterClrMapping/>
+  </p:clrMapOvr>
+</p:notes>
+</file>
+
+<file path=ppt/notesSlides/notesSlide4.xml><?xml version="1.0" encoding="utf-8"?>
+<p:notes xmlns:a="http://schemas.openxmlformats.org/drawingml/2006/main" xmlns:r="http://schemas.openxmlformats.org/officeDocument/2006/relationships" xmlns:p="http://schemas.openxmlformats.org/presentationml/2006/main">
+  <p:cSld>
+    <p:spTree>
+      <p:nvGrpSpPr>
+        <p:cNvPr id="1" name=""/>
+        <p:cNvGrpSpPr/>
+        <p:nvPr/>
+      </p:nvGrpSpPr>
+      <p:grpSpPr>
+        <a:xfrm>
+          <a:off x="0" y="0"/>
+          <a:ext cx="0" cy="0"/>
+          <a:chOff x="0" y="0"/>
+          <a:chExt cx="0" cy="0"/>
+        </a:xfrm>
+      </p:grpSpPr>
+      <p:sp>
+        <p:nvSpPr>
+          <p:cNvPr id="2" name="Slide Image Placeholder 1"/>
+          <p:cNvSpPr>
+            <a:spLocks noGrp="1" noRot="1" noChangeAspect="1"/>
+          </p:cNvSpPr>
+          <p:nvPr>
+            <p:ph type="sldImg"/>
+          </p:nvPr>
+        </p:nvSpPr>
+        <p:spPr/>
+      </p:sp>
+      <p:sp>
+        <p:nvSpPr>
+          <p:cNvPr id="3" name="Notes Placeholder 2"/>
+          <p:cNvSpPr>
+            <a:spLocks noGrp="1"/>
+          </p:cNvSpPr>
+          <p:nvPr>
+            <p:ph type="body" idx="1"/>
+          </p:nvPr>
+        </p:nvSpPr>
+        <p:spPr/>
+        <p:txBody>
+          <a:bodyPr/>
+          <a:lstStyle/>
+          <a:p>
+            <a:endParaRPr lang="en-US"/>
+          </a:p>
+        </p:txBody>
+      </p:sp>
+      <p:sp>
+        <p:nvSpPr>
+          <p:cNvPr id="4" name="Slide Number Placeholder 3"/>
+          <p:cNvSpPr>
+            <a:spLocks noGrp="1"/>
+          </p:cNvSpPr>
+          <p:nvPr>
+            <p:ph type="sldNum" sz="quarter" idx="10"/>
+          </p:nvPr>
+        </p:nvSpPr>
+        <p:spPr/>
+        <p:txBody>
+          <a:bodyPr/>
+          <a:lstStyle/>
+          <a:p>
+            <a:fld id="{894C5D8A-26A7-4FBB-B760-7D6664333938}" type="slidenum">
+              <a:rPr lang="en-US" smtClean="0"/>
+              <a:t>9</a:t>
+            </a:fld>
+            <a:endParaRPr lang="en-US"/>
+          </a:p>
+        </p:txBody>
+      </p:sp>
+    </p:spTree>
+    <p:extLst>
+      <p:ext uri="{BB962C8B-B14F-4D97-AF65-F5344CB8AC3E}">
+        <p14:creationId xmlns:p14="http://schemas.microsoft.com/office/powerpoint/2010/main" val="2995129900"/>
       </p:ext>
     </p:extLst>
   </p:cSld>
@@ -7173,7 +6886,6 @@
               <a:rPr lang="en-US" sz="1700" b="1" dirty="0" smtClean="0"/>
               <a:t>Team:</a:t>
             </a:r>
-            <a:endParaRPr lang="en-US" sz="1700" b="1" dirty="0" smtClean="0"/>
           </a:p>
           <a:p>
             <a:r>
@@ -7280,6 +6992,111 @@
     <p:extLst>
       <p:ext uri="{BB962C8B-B14F-4D97-AF65-F5344CB8AC3E}">
         <p14:creationId xmlns:p14="http://schemas.microsoft.com/office/powerpoint/2010/main" val="2589062411"/>
+      </p:ext>
+    </p:extLst>
+  </p:cSld>
+  <p:clrMapOvr>
+    <a:masterClrMapping/>
+  </p:clrMapOvr>
+  <p:timing>
+    <p:tnLst>
+      <p:par>
+        <p:cTn id="1" dur="indefinite" restart="never" nodeType="tmRoot"/>
+      </p:par>
+    </p:tnLst>
+  </p:timing>
+</p:sld>
+</file>
+
+<file path=ppt/slides/slide10.xml><?xml version="1.0" encoding="utf-8"?>
+<p:sld xmlns:a="http://schemas.openxmlformats.org/drawingml/2006/main" xmlns:r="http://schemas.openxmlformats.org/officeDocument/2006/relationships" xmlns:p="http://schemas.openxmlformats.org/presentationml/2006/main">
+  <p:cSld>
+    <p:spTree>
+      <p:nvGrpSpPr>
+        <p:cNvPr id="1" name=""/>
+        <p:cNvGrpSpPr/>
+        <p:nvPr/>
+      </p:nvGrpSpPr>
+      <p:grpSpPr>
+        <a:xfrm>
+          <a:off x="0" y="0"/>
+          <a:ext cx="0" cy="0"/>
+          <a:chOff x="0" y="0"/>
+          <a:chExt cx="0" cy="0"/>
+        </a:xfrm>
+      </p:grpSpPr>
+      <p:sp>
+        <p:nvSpPr>
+          <p:cNvPr id="2" name="Title 1"/>
+          <p:cNvSpPr>
+            <a:spLocks noGrp="1"/>
+          </p:cNvSpPr>
+          <p:nvPr>
+            <p:ph type="title"/>
+          </p:nvPr>
+        </p:nvSpPr>
+        <p:spPr/>
+        <p:txBody>
+          <a:bodyPr/>
+          <a:lstStyle/>
+          <a:p>
+            <a:endParaRPr lang="en-US"/>
+          </a:p>
+        </p:txBody>
+      </p:sp>
+      <p:sp>
+        <p:nvSpPr>
+          <p:cNvPr id="3" name="Content Placeholder 2"/>
+          <p:cNvSpPr>
+            <a:spLocks noGrp="1"/>
+          </p:cNvSpPr>
+          <p:nvPr>
+            <p:ph idx="1"/>
+          </p:nvPr>
+        </p:nvSpPr>
+        <p:spPr/>
+        <p:txBody>
+          <a:bodyPr/>
+          <a:lstStyle/>
+          <a:p>
+            <a:endParaRPr lang="en-US" dirty="0"/>
+          </a:p>
+        </p:txBody>
+      </p:sp>
+      <p:sp>
+        <p:nvSpPr>
+          <p:cNvPr id="4" name="TextBox 3"/>
+          <p:cNvSpPr txBox="1"/>
+          <p:nvPr/>
+        </p:nvSpPr>
+        <p:spPr>
+          <a:xfrm>
+            <a:off x="3505200" y="3272639"/>
+            <a:ext cx="1896481" cy="584775"/>
+          </a:xfrm>
+          <a:prstGeom prst="rect">
+            <a:avLst/>
+          </a:prstGeom>
+          <a:noFill/>
+        </p:spPr>
+        <p:txBody>
+          <a:bodyPr wrap="none" rtlCol="0">
+            <a:spAutoFit/>
+          </a:bodyPr>
+          <a:lstStyle/>
+          <a:p>
+            <a:r>
+              <a:rPr lang="en-US" sz="3200" dirty="0" smtClean="0"/>
+              <a:t>Thank You</a:t>
+            </a:r>
+            <a:endParaRPr lang="en-US" sz="3200" dirty="0"/>
+          </a:p>
+        </p:txBody>
+      </p:sp>
+    </p:spTree>
+    <p:extLst>
+      <p:ext uri="{BB962C8B-B14F-4D97-AF65-F5344CB8AC3E}">
+        <p14:creationId xmlns:p14="http://schemas.microsoft.com/office/powerpoint/2010/main" val="947826532"/>
       </p:ext>
     </p:extLst>
   </p:cSld>
@@ -7332,15 +7149,7 @@
           <a:p>
             <a:r>
               <a:rPr lang="en-US" sz="3600" dirty="0" smtClean="0"/>
-              <a:t>Main </a:t>
-            </a:r>
-            <a:r>
-              <a:rPr lang="en-US" sz="3600" dirty="0" smtClean="0"/>
-              <a:t>Technologies</a:t>
-            </a:r>
-            <a:r>
-              <a:rPr lang="en-US" sz="3600" dirty="0" smtClean="0"/>
-              <a:t>	</a:t>
+              <a:t>Main Technologies	</a:t>
             </a:r>
             <a:endParaRPr lang="en-US" sz="3600" dirty="0"/>
           </a:p>
@@ -7811,11 +7620,7 @@
           <a:p>
             <a:r>
               <a:rPr lang="en-US" sz="3600" dirty="0" smtClean="0"/>
-              <a:t>Twitter </a:t>
-            </a:r>
-            <a:r>
-              <a:rPr lang="en-US" sz="3600" dirty="0" smtClean="0"/>
-              <a:t>login</a:t>
+              <a:t>Twitter login</a:t>
             </a:r>
             <a:endParaRPr lang="en-US" sz="3600" dirty="0"/>
           </a:p>
@@ -8367,72 +8172,45 @@
           </a:p>
         </p:txBody>
       </p:sp>
-      <p:sp>
-        <p:nvSpPr>
-          <p:cNvPr id="3" name="Content Placeholder 2"/>
-          <p:cNvSpPr>
-            <a:spLocks noGrp="1"/>
-          </p:cNvSpPr>
+      <p:pic>
+        <p:nvPicPr>
+          <p:cNvPr id="4" name="Content Placeholder 3"/>
+          <p:cNvPicPr>
+            <a:picLocks noGrp="1" noChangeAspect="1"/>
+          </p:cNvPicPr>
           <p:nvPr>
             <p:ph idx="1"/>
           </p:nvPr>
-        </p:nvSpPr>
-        <p:spPr/>
-        <p:txBody>
-          <a:bodyPr/>
-          <a:lstStyle/>
-          <a:p>
-            <a:endParaRPr lang="en-US" dirty="0"/>
-          </a:p>
-        </p:txBody>
-      </p:sp>
-      <p:sp>
-        <p:nvSpPr>
-          <p:cNvPr id="4" name="TextBox 3"/>
-          <p:cNvSpPr txBox="1"/>
-          <p:nvPr/>
-        </p:nvSpPr>
+        </p:nvPicPr>
+        <p:blipFill>
+          <a:blip r:embed="rId3">
+            <a:extLst>
+              <a:ext uri="{28A0092B-C50C-407E-A947-70E740481C1C}">
+                <a14:useLocalDpi xmlns:a14="http://schemas.microsoft.com/office/drawing/2010/main" val="0"/>
+              </a:ext>
+            </a:extLst>
+          </a:blip>
+          <a:stretch>
+            <a:fillRect/>
+          </a:stretch>
+        </p:blipFill>
         <p:spPr>
           <a:xfrm>
-            <a:off x="3505200" y="3272639"/>
-            <a:ext cx="1896481" cy="584775"/>
+            <a:off x="1330375" y="1219200"/>
+            <a:ext cx="6528969" cy="4022725"/>
           </a:xfrm>
-          <a:prstGeom prst="rect">
-            <a:avLst/>
-          </a:prstGeom>
-          <a:noFill/>
         </p:spPr>
-        <p:txBody>
-          <a:bodyPr wrap="none" rtlCol="0">
-            <a:spAutoFit/>
-          </a:bodyPr>
-          <a:lstStyle/>
-          <a:p>
-            <a:r>
-              <a:rPr lang="en-US" sz="3200" dirty="0" smtClean="0"/>
-              <a:t>Thank You</a:t>
-            </a:r>
-            <a:endParaRPr lang="en-US" sz="3200" dirty="0"/>
-          </a:p>
-        </p:txBody>
-      </p:sp>
+      </p:pic>
     </p:spTree>
     <p:extLst>
       <p:ext uri="{BB962C8B-B14F-4D97-AF65-F5344CB8AC3E}">
-        <p14:creationId xmlns:p14="http://schemas.microsoft.com/office/powerpoint/2010/main" val="947826532"/>
+        <p14:creationId xmlns:p14="http://schemas.microsoft.com/office/powerpoint/2010/main" val="1407507110"/>
       </p:ext>
     </p:extLst>
   </p:cSld>
   <p:clrMapOvr>
     <a:masterClrMapping/>
   </p:clrMapOvr>
-  <p:timing>
-    <p:tnLst>
-      <p:par>
-        <p:cTn id="1" dur="indefinite" restart="never" nodeType="tmRoot"/>
-      </p:par>
-    </p:tnLst>
-  </p:timing>
 </p:sld>
 </file>
 

</xml_diff>